<commit_message>
chipping away at docs
</commit_message>
<xml_diff>
--- a/docs/manuscripts/euc manuscript/figs/euc_MS_figure_panels_JL_20-09-17.pptx
+++ b/docs/manuscripts/euc manuscript/figs/euc_MS_figure_panels_JL_20-09-17.pptx
@@ -203,7 +203,7 @@
           <a:p>
             <a:fld id="{36C24D47-6580-4785-9462-CADD8599AFB8}" type="datetimeFigureOut">
               <a:rPr lang="en-AU" smtClean="0"/>
-              <a:t>22/09/2017</a:t>
+              <a:t>12/10/2017</a:t>
             </a:fld>
             <a:endParaRPr lang="en-AU"/>
           </a:p>
@@ -1460,7 +1460,7 @@
           <a:p>
             <a:fld id="{DBF67EF4-3E3F-41D9-AB59-178FFA85FB21}" type="datetimeFigureOut">
               <a:rPr lang="en-AU" smtClean="0"/>
-              <a:t>22/09/2017</a:t>
+              <a:t>12/10/2017</a:t>
             </a:fld>
             <a:endParaRPr lang="en-AU"/>
           </a:p>
@@ -1630,7 +1630,7 @@
           <a:p>
             <a:fld id="{DBF67EF4-3E3F-41D9-AB59-178FFA85FB21}" type="datetimeFigureOut">
               <a:rPr lang="en-AU" smtClean="0"/>
-              <a:t>22/09/2017</a:t>
+              <a:t>12/10/2017</a:t>
             </a:fld>
             <a:endParaRPr lang="en-AU"/>
           </a:p>
@@ -1810,7 +1810,7 @@
           <a:p>
             <a:fld id="{DBF67EF4-3E3F-41D9-AB59-178FFA85FB21}" type="datetimeFigureOut">
               <a:rPr lang="en-AU" smtClean="0"/>
-              <a:t>22/09/2017</a:t>
+              <a:t>12/10/2017</a:t>
             </a:fld>
             <a:endParaRPr lang="en-AU"/>
           </a:p>
@@ -1980,7 +1980,7 @@
           <a:p>
             <a:fld id="{DBF67EF4-3E3F-41D9-AB59-178FFA85FB21}" type="datetimeFigureOut">
               <a:rPr lang="en-AU" smtClean="0"/>
-              <a:t>22/09/2017</a:t>
+              <a:t>12/10/2017</a:t>
             </a:fld>
             <a:endParaRPr lang="en-AU"/>
           </a:p>
@@ -2224,7 +2224,7 @@
           <a:p>
             <a:fld id="{DBF67EF4-3E3F-41D9-AB59-178FFA85FB21}" type="datetimeFigureOut">
               <a:rPr lang="en-AU" smtClean="0"/>
-              <a:t>22/09/2017</a:t>
+              <a:t>12/10/2017</a:t>
             </a:fld>
             <a:endParaRPr lang="en-AU"/>
           </a:p>
@@ -2456,7 +2456,7 @@
           <a:p>
             <a:fld id="{DBF67EF4-3E3F-41D9-AB59-178FFA85FB21}" type="datetimeFigureOut">
               <a:rPr lang="en-AU" smtClean="0"/>
-              <a:t>22/09/2017</a:t>
+              <a:t>12/10/2017</a:t>
             </a:fld>
             <a:endParaRPr lang="en-AU"/>
           </a:p>
@@ -2823,7 +2823,7 @@
           <a:p>
             <a:fld id="{DBF67EF4-3E3F-41D9-AB59-178FFA85FB21}" type="datetimeFigureOut">
               <a:rPr lang="en-AU" smtClean="0"/>
-              <a:t>22/09/2017</a:t>
+              <a:t>12/10/2017</a:t>
             </a:fld>
             <a:endParaRPr lang="en-AU"/>
           </a:p>
@@ -2941,7 +2941,7 @@
           <a:p>
             <a:fld id="{DBF67EF4-3E3F-41D9-AB59-178FFA85FB21}" type="datetimeFigureOut">
               <a:rPr lang="en-AU" smtClean="0"/>
-              <a:t>22/09/2017</a:t>
+              <a:t>12/10/2017</a:t>
             </a:fld>
             <a:endParaRPr lang="en-AU"/>
           </a:p>
@@ -3036,7 +3036,7 @@
           <a:p>
             <a:fld id="{DBF67EF4-3E3F-41D9-AB59-178FFA85FB21}" type="datetimeFigureOut">
               <a:rPr lang="en-AU" smtClean="0"/>
-              <a:t>22/09/2017</a:t>
+              <a:t>12/10/2017</a:t>
             </a:fld>
             <a:endParaRPr lang="en-AU"/>
           </a:p>
@@ -3313,7 +3313,7 @@
           <a:p>
             <a:fld id="{DBF67EF4-3E3F-41D9-AB59-178FFA85FB21}" type="datetimeFigureOut">
               <a:rPr lang="en-AU" smtClean="0"/>
-              <a:t>22/09/2017</a:t>
+              <a:t>12/10/2017</a:t>
             </a:fld>
             <a:endParaRPr lang="en-AU"/>
           </a:p>
@@ -3570,7 +3570,7 @@
           <a:p>
             <a:fld id="{DBF67EF4-3E3F-41D9-AB59-178FFA85FB21}" type="datetimeFigureOut">
               <a:rPr lang="en-AU" smtClean="0"/>
-              <a:t>22/09/2017</a:t>
+              <a:t>12/10/2017</a:t>
             </a:fld>
             <a:endParaRPr lang="en-AU"/>
           </a:p>
@@ -3783,7 +3783,7 @@
           <a:p>
             <a:fld id="{DBF67EF4-3E3F-41D9-AB59-178FFA85FB21}" type="datetimeFigureOut">
               <a:rPr lang="en-AU" smtClean="0"/>
-              <a:t>22/09/2017</a:t>
+              <a:t>12/10/2017</a:t>
             </a:fld>
             <a:endParaRPr lang="en-AU"/>
           </a:p>
@@ -4363,6 +4363,36 @@
           </p:txBody>
         </p:sp>
       </p:grpSp>
+      <p:pic>
+        <p:nvPicPr>
+          <p:cNvPr id="8" name="Picture 7"/>
+          <p:cNvPicPr>
+            <a:picLocks noChangeAspect="1"/>
+          </p:cNvPicPr>
+          <p:nvPr/>
+        </p:nvPicPr>
+        <p:blipFill>
+          <a:blip r:embed="rId6" cstate="print">
+            <a:extLst>
+              <a:ext uri="{28A0092B-C50C-407E-A947-70E740481C1C}">
+                <a14:useLocalDpi xmlns:a14="http://schemas.microsoft.com/office/drawing/2010/main" val="0"/>
+              </a:ext>
+            </a:extLst>
+          </a:blip>
+          <a:stretch>
+            <a:fillRect/>
+          </a:stretch>
+        </p:blipFill>
+        <p:spPr>
+          <a:xfrm>
+            <a:off x="411378" y="6703184"/>
+            <a:ext cx="5553467" cy="5052070"/>
+          </a:xfrm>
+          <a:prstGeom prst="rect">
+            <a:avLst/>
+          </a:prstGeom>
+        </p:spPr>
+      </p:pic>
     </p:spTree>
     <p:extLst>
       <p:ext uri="{BB962C8B-B14F-4D97-AF65-F5344CB8AC3E}">

</xml_diff>